<commit_message>
Final tweeks to coded data access presentation
</commit_message>
<xml_diff>
--- a/presentations/Coded_data_access_DB.pptx
+++ b/presentations/Coded_data_access_DB.pptx
@@ -225,7 +225,7 @@
 <file path=ppt/revisionInfo.xml><?xml version="1.0" encoding="utf-8"?>
 <p1510:revInfo xmlns:a="http://schemas.openxmlformats.org/drawingml/2006/main" xmlns:r="http://schemas.openxmlformats.org/officeDocument/2006/relationships" xmlns:p1510="http://schemas.microsoft.com/office/powerpoint/2015/10/main">
   <p1510:revLst>
-    <p1510:client id="{DD14D4EE-78D3-403F-B63C-20DE5042EA84}" v="1563" dt="2024-04-17T23:34:12.487"/>
+    <p1510:client id="{DD14D4EE-78D3-403F-B63C-20DE5042EA84}" v="1564" dt="2024-04-18T15:05:10.615"/>
   </p1510:revLst>
 </p1510:revInfo>
 </file>
@@ -235,12 +235,12 @@
   <pc:docChgLst>
     <pc:chgData name="Bosworth, David@DWR" userId="2b2e0704-faa3-42f7-b074-2df921de8f03" providerId="ADAL" clId="{DD14D4EE-78D3-403F-B63C-20DE5042EA84}"/>
     <pc:docChg chg="undo redo custSel addSld delSld modSld sldOrd addSection delSection modSection modShowInfo">
-      <pc:chgData name="Bosworth, David@DWR" userId="2b2e0704-faa3-42f7-b074-2df921de8f03" providerId="ADAL" clId="{DD14D4EE-78D3-403F-B63C-20DE5042EA84}" dt="2024-04-17T23:34:31.435" v="14873" actId="20577"/>
+      <pc:chgData name="Bosworth, David@DWR" userId="2b2e0704-faa3-42f7-b074-2df921de8f03" providerId="ADAL" clId="{DD14D4EE-78D3-403F-B63C-20DE5042EA84}" dt="2024-04-18T15:51:23.808" v="15776" actId="20577"/>
       <pc:docMkLst>
         <pc:docMk/>
       </pc:docMkLst>
       <pc:sldChg chg="addSp modSp new mod modNotesTx">
-        <pc:chgData name="Bosworth, David@DWR" userId="2b2e0704-faa3-42f7-b074-2df921de8f03" providerId="ADAL" clId="{DD14D4EE-78D3-403F-B63C-20DE5042EA84}" dt="2024-04-17T23:07:24.092" v="14856" actId="20577"/>
+        <pc:chgData name="Bosworth, David@DWR" userId="2b2e0704-faa3-42f7-b074-2df921de8f03" providerId="ADAL" clId="{DD14D4EE-78D3-403F-B63C-20DE5042EA84}" dt="2024-04-18T15:38:18.446" v="15654" actId="20577"/>
         <pc:sldMkLst>
           <pc:docMk/>
           <pc:sldMk cId="1352389047" sldId="256"/>
@@ -287,7 +287,7 @@
         </pc:picChg>
       </pc:sldChg>
       <pc:sldChg chg="addSp modSp new mod setBg modNotesTx">
-        <pc:chgData name="Bosworth, David@DWR" userId="2b2e0704-faa3-42f7-b074-2df921de8f03" providerId="ADAL" clId="{DD14D4EE-78D3-403F-B63C-20DE5042EA84}" dt="2024-04-17T22:44:40.871" v="14306" actId="20577"/>
+        <pc:chgData name="Bosworth, David@DWR" userId="2b2e0704-faa3-42f7-b074-2df921de8f03" providerId="ADAL" clId="{DD14D4EE-78D3-403F-B63C-20DE5042EA84}" dt="2024-04-18T14:59:11.570" v="15125" actId="20577"/>
         <pc:sldMkLst>
           <pc:docMk/>
           <pc:sldMk cId="3475146652" sldId="257"/>
@@ -963,7 +963,7 @@
         </pc:picChg>
       </pc:sldChg>
       <pc:sldChg chg="addSp delSp modSp new mod delAnim modAnim modNotesTx">
-        <pc:chgData name="Bosworth, David@DWR" userId="2b2e0704-faa3-42f7-b074-2df921de8f03" providerId="ADAL" clId="{DD14D4EE-78D3-403F-B63C-20DE5042EA84}" dt="2024-04-16T21:06:10.004" v="12376"/>
+        <pc:chgData name="Bosworth, David@DWR" userId="2b2e0704-faa3-42f7-b074-2df921de8f03" providerId="ADAL" clId="{DD14D4EE-78D3-403F-B63C-20DE5042EA84}" dt="2024-04-18T00:01:54.954" v="15082" actId="20577"/>
         <pc:sldMkLst>
           <pc:docMk/>
           <pc:sldMk cId="3138661498" sldId="269"/>
@@ -2375,7 +2375,7 @@
         </pc:spChg>
       </pc:sldChg>
       <pc:sldChg chg="addSp delSp modSp new mod setBg modNotesTx">
-        <pc:chgData name="Bosworth, David@DWR" userId="2b2e0704-faa3-42f7-b074-2df921de8f03" providerId="ADAL" clId="{DD14D4EE-78D3-403F-B63C-20DE5042EA84}" dt="2024-04-17T16:53:27.158" v="13645" actId="20577"/>
+        <pc:chgData name="Bosworth, David@DWR" userId="2b2e0704-faa3-42f7-b074-2df921de8f03" providerId="ADAL" clId="{DD14D4EE-78D3-403F-B63C-20DE5042EA84}" dt="2024-04-18T14:58:27.937" v="15117" actId="20577"/>
         <pc:sldMkLst>
           <pc:docMk/>
           <pc:sldMk cId="1572437005" sldId="297"/>
@@ -3866,7 +3866,7 @@
         </pc:picChg>
       </pc:sldChg>
       <pc:sldChg chg="addSp delSp modSp add mod addAnim delAnim modAnim modNotesTx">
-        <pc:chgData name="Bosworth, David@DWR" userId="2b2e0704-faa3-42f7-b074-2df921de8f03" providerId="ADAL" clId="{DD14D4EE-78D3-403F-B63C-20DE5042EA84}" dt="2024-04-16T23:38:48.132" v="12752" actId="403"/>
+        <pc:chgData name="Bosworth, David@DWR" userId="2b2e0704-faa3-42f7-b074-2df921de8f03" providerId="ADAL" clId="{DD14D4EE-78D3-403F-B63C-20DE5042EA84}" dt="2024-04-18T00:02:31.705" v="15105" actId="20577"/>
         <pc:sldMkLst>
           <pc:docMk/>
           <pc:sldMk cId="700494814" sldId="307"/>
@@ -4175,7 +4175,7 @@
         </pc:cxnChg>
       </pc:sldChg>
       <pc:sldChg chg="addSp delSp modSp add mod delAnim modAnim modNotesTx">
-        <pc:chgData name="Bosworth, David@DWR" userId="2b2e0704-faa3-42f7-b074-2df921de8f03" providerId="ADAL" clId="{DD14D4EE-78D3-403F-B63C-20DE5042EA84}" dt="2024-04-17T21:47:46.496" v="13964" actId="20577"/>
+        <pc:chgData name="Bosworth, David@DWR" userId="2b2e0704-faa3-42f7-b074-2df921de8f03" providerId="ADAL" clId="{DD14D4EE-78D3-403F-B63C-20DE5042EA84}" dt="2024-04-18T15:07:45.338" v="15488" actId="20577"/>
         <pc:sldMkLst>
           <pc:docMk/>
           <pc:sldMk cId="680173580" sldId="309"/>
@@ -5955,12 +5955,20 @@
           </ac:picMkLst>
         </pc:picChg>
       </pc:sldChg>
-      <pc:sldChg chg="addSp delSp modSp add mod delAnim modAnim modNotesTx">
-        <pc:chgData name="Bosworth, David@DWR" userId="2b2e0704-faa3-42f7-b074-2df921de8f03" providerId="ADAL" clId="{DD14D4EE-78D3-403F-B63C-20DE5042EA84}" dt="2024-04-17T23:34:31.435" v="14873" actId="20577"/>
+      <pc:sldChg chg="addSp delSp modSp add mod addAnim delAnim modAnim modNotesTx">
+        <pc:chgData name="Bosworth, David@DWR" userId="2b2e0704-faa3-42f7-b074-2df921de8f03" providerId="ADAL" clId="{DD14D4EE-78D3-403F-B63C-20DE5042EA84}" dt="2024-04-18T15:08:41.321" v="15535" actId="20577"/>
         <pc:sldMkLst>
           <pc:docMk/>
           <pc:sldMk cId="3360017583" sldId="326"/>
         </pc:sldMkLst>
+        <pc:spChg chg="mod">
+          <ac:chgData name="Bosworth, David@DWR" userId="2b2e0704-faa3-42f7-b074-2df921de8f03" providerId="ADAL" clId="{DD14D4EE-78D3-403F-B63C-20DE5042EA84}" dt="2024-04-18T15:04:46.575" v="15136" actId="20577"/>
+          <ac:spMkLst>
+            <pc:docMk/>
+            <pc:sldMk cId="3360017583" sldId="326"/>
+            <ac:spMk id="2" creationId="{5EE6C48E-84A0-AC6A-7DC3-20F26BD08C15}"/>
+          </ac:spMkLst>
+        </pc:spChg>
         <pc:spChg chg="del">
           <ac:chgData name="Bosworth, David@DWR" userId="2b2e0704-faa3-42f7-b074-2df921de8f03" providerId="ADAL" clId="{DD14D4EE-78D3-403F-B63C-20DE5042EA84}" dt="2024-04-16T21:33:48.399" v="12546" actId="478"/>
           <ac:spMkLst>
@@ -5978,7 +5986,7 @@
           </ac:spMkLst>
         </pc:spChg>
         <pc:spChg chg="mod ord">
-          <ac:chgData name="Bosworth, David@DWR" userId="2b2e0704-faa3-42f7-b074-2df921de8f03" providerId="ADAL" clId="{DD14D4EE-78D3-403F-B63C-20DE5042EA84}" dt="2024-04-16T21:54:12.962" v="12741" actId="14100"/>
+          <ac:chgData name="Bosworth, David@DWR" userId="2b2e0704-faa3-42f7-b074-2df921de8f03" providerId="ADAL" clId="{DD14D4EE-78D3-403F-B63C-20DE5042EA84}" dt="2024-04-18T15:05:26.171" v="15145" actId="1076"/>
           <ac:spMkLst>
             <pc:docMk/>
             <pc:sldMk cId="3360017583" sldId="326"/>
@@ -6001,8 +6009,8 @@
             <ac:spMk id="16" creationId="{9917A085-071D-AAF3-D084-986533A8839D}"/>
           </ac:spMkLst>
         </pc:spChg>
-        <pc:spChg chg="add mod">
-          <ac:chgData name="Bosworth, David@DWR" userId="2b2e0704-faa3-42f7-b074-2df921de8f03" providerId="ADAL" clId="{DD14D4EE-78D3-403F-B63C-20DE5042EA84}" dt="2024-04-16T21:55:25.034" v="12749" actId="164"/>
+        <pc:spChg chg="add del mod topLvl">
+          <ac:chgData name="Bosworth, David@DWR" userId="2b2e0704-faa3-42f7-b074-2df921de8f03" providerId="ADAL" clId="{DD14D4EE-78D3-403F-B63C-20DE5042EA84}" dt="2024-04-18T15:05:13.214" v="15144" actId="478"/>
           <ac:spMkLst>
             <pc:docMk/>
             <pc:sldMk cId="3360017583" sldId="326"/>
@@ -6033,24 +6041,24 @@
             <ac:grpSpMk id="18" creationId="{20471542-80C7-8F74-09E7-A26B53673340}"/>
           </ac:grpSpMkLst>
         </pc:grpChg>
-        <pc:grpChg chg="add mod">
-          <ac:chgData name="Bosworth, David@DWR" userId="2b2e0704-faa3-42f7-b074-2df921de8f03" providerId="ADAL" clId="{DD14D4EE-78D3-403F-B63C-20DE5042EA84}" dt="2024-04-16T21:49:13.418" v="12699" actId="164"/>
+        <pc:grpChg chg="add del mod">
+          <ac:chgData name="Bosworth, David@DWR" userId="2b2e0704-faa3-42f7-b074-2df921de8f03" providerId="ADAL" clId="{DD14D4EE-78D3-403F-B63C-20DE5042EA84}" dt="2024-04-18T15:04:53.714" v="15140" actId="478"/>
           <ac:grpSpMkLst>
             <pc:docMk/>
             <pc:sldMk cId="3360017583" sldId="326"/>
             <ac:grpSpMk id="20" creationId="{C945AB72-8F8B-D7C7-AA98-700E1EA6AA81}"/>
           </ac:grpSpMkLst>
         </pc:grpChg>
-        <pc:grpChg chg="add mod">
-          <ac:chgData name="Bosworth, David@DWR" userId="2b2e0704-faa3-42f7-b074-2df921de8f03" providerId="ADAL" clId="{DD14D4EE-78D3-403F-B63C-20DE5042EA84}" dt="2024-04-16T21:55:01.123" v="12746" actId="164"/>
+        <pc:grpChg chg="add del mod">
+          <ac:chgData name="Bosworth, David@DWR" userId="2b2e0704-faa3-42f7-b074-2df921de8f03" providerId="ADAL" clId="{DD14D4EE-78D3-403F-B63C-20DE5042EA84}" dt="2024-04-18T15:04:49.928" v="15137" actId="478"/>
           <ac:grpSpMkLst>
             <pc:docMk/>
             <pc:sldMk cId="3360017583" sldId="326"/>
             <ac:grpSpMk id="23" creationId="{D7CF3055-8960-DA53-F1D1-8DC745B4C8DD}"/>
           </ac:grpSpMkLst>
         </pc:grpChg>
-        <pc:grpChg chg="add mod">
-          <ac:chgData name="Bosworth, David@DWR" userId="2b2e0704-faa3-42f7-b074-2df921de8f03" providerId="ADAL" clId="{DD14D4EE-78D3-403F-B63C-20DE5042EA84}" dt="2024-04-16T21:55:25.034" v="12749" actId="164"/>
+        <pc:grpChg chg="add del mod">
+          <ac:chgData name="Bosworth, David@DWR" userId="2b2e0704-faa3-42f7-b074-2df921de8f03" providerId="ADAL" clId="{DD14D4EE-78D3-403F-B63C-20DE5042EA84}" dt="2024-04-18T15:05:10.614" v="15143" actId="165"/>
           <ac:grpSpMkLst>
             <pc:docMk/>
             <pc:sldMk cId="3360017583" sldId="326"/>
@@ -6065,16 +6073,16 @@
             <ac:picMk id="5" creationId="{0EDF5F1E-23F1-09AE-B45D-A8CBD43C4A6E}"/>
           </ac:picMkLst>
         </pc:picChg>
-        <pc:picChg chg="add mod">
-          <ac:chgData name="Bosworth, David@DWR" userId="2b2e0704-faa3-42f7-b074-2df921de8f03" providerId="ADAL" clId="{DD14D4EE-78D3-403F-B63C-20DE5042EA84}" dt="2024-04-16T21:46:25.850" v="12672" actId="1076"/>
+        <pc:picChg chg="add del mod">
+          <ac:chgData name="Bosworth, David@DWR" userId="2b2e0704-faa3-42f7-b074-2df921de8f03" providerId="ADAL" clId="{DD14D4EE-78D3-403F-B63C-20DE5042EA84}" dt="2024-04-18T15:04:52.311" v="15139" actId="478"/>
           <ac:picMkLst>
             <pc:docMk/>
             <pc:sldMk cId="3360017583" sldId="326"/>
             <ac:picMk id="6" creationId="{0EDF5F1E-23F1-09AE-B45D-A8CBD43C4A6E}"/>
           </ac:picMkLst>
         </pc:picChg>
-        <pc:picChg chg="add mod">
-          <ac:chgData name="Bosworth, David@DWR" userId="2b2e0704-faa3-42f7-b074-2df921de8f03" providerId="ADAL" clId="{DD14D4EE-78D3-403F-B63C-20DE5042EA84}" dt="2024-04-16T21:46:25.850" v="12672" actId="1076"/>
+        <pc:picChg chg="add del mod">
+          <ac:chgData name="Bosworth, David@DWR" userId="2b2e0704-faa3-42f7-b074-2df921de8f03" providerId="ADAL" clId="{DD14D4EE-78D3-403F-B63C-20DE5042EA84}" dt="2024-04-18T15:04:51.529" v="15138" actId="478"/>
           <ac:picMkLst>
             <pc:docMk/>
             <pc:sldMk cId="3360017583" sldId="326"/>
@@ -6105,8 +6113,8 @@
             <ac:picMk id="19" creationId="{EFCBDE23-6D58-66DF-8DA6-15DA293A263D}"/>
           </ac:picMkLst>
         </pc:picChg>
-        <pc:picChg chg="add mod">
-          <ac:chgData name="Bosworth, David@DWR" userId="2b2e0704-faa3-42f7-b074-2df921de8f03" providerId="ADAL" clId="{DD14D4EE-78D3-403F-B63C-20DE5042EA84}" dt="2024-04-16T21:55:25.034" v="12749" actId="164"/>
+        <pc:picChg chg="add mod topLvl">
+          <ac:chgData name="Bosworth, David@DWR" userId="2b2e0704-faa3-42f7-b074-2df921de8f03" providerId="ADAL" clId="{DD14D4EE-78D3-403F-B63C-20DE5042EA84}" dt="2024-04-18T15:05:26.171" v="15145" actId="1076"/>
           <ac:picMkLst>
             <pc:docMk/>
             <pc:sldMk cId="3360017583" sldId="326"/>
@@ -6114,8 +6122,8 @@
           </ac:picMkLst>
         </pc:picChg>
       </pc:sldChg>
-      <pc:sldChg chg="addSp delSp modSp add mod modAnim">
-        <pc:chgData name="Bosworth, David@DWR" userId="2b2e0704-faa3-42f7-b074-2df921de8f03" providerId="ADAL" clId="{DD14D4EE-78D3-403F-B63C-20DE5042EA84}" dt="2024-04-17T16:03:43.273" v="13366"/>
+      <pc:sldChg chg="addSp delSp modSp add mod modAnim modNotesTx">
+        <pc:chgData name="Bosworth, David@DWR" userId="2b2e0704-faa3-42f7-b074-2df921de8f03" providerId="ADAL" clId="{DD14D4EE-78D3-403F-B63C-20DE5042EA84}" dt="2024-04-18T15:51:23.808" v="15776" actId="20577"/>
         <pc:sldMkLst>
           <pc:docMk/>
           <pc:sldMk cId="2666587906" sldId="327"/>
@@ -9484,7 +9492,7 @@
           <a:p>
             <a:fld id="{4F9EF58F-F6AB-426C-9619-511C9AA557E5}" type="datetimeFigureOut">
               <a:rPr lang="en-US" smtClean="0"/>
-              <a:t>4/17/2024</a:t>
+              <a:t>4/18/2024</a:t>
             </a:fld>
             <a:endParaRPr lang="en-US"/>
           </a:p>
@@ -9840,6 +9848,29 @@
               <a:t>This is a large topic, so this is meant to be a brief overview of topic – beginner to intermediate-level</a:t>
             </a:r>
           </a:p>
+          <a:p>
+            <a:pPr marL="0" marR="0" lvl="0" indent="0" algn="l" defTabSz="914400" rtl="0" eaLnBrk="1" fontAlgn="auto" latinLnBrk="0" hangingPunct="1">
+              <a:lnSpc>
+                <a:spcPct val="100000"/>
+              </a:lnSpc>
+              <a:spcBef>
+                <a:spcPts val="0"/>
+              </a:spcBef>
+              <a:spcAft>
+                <a:spcPts val="0"/>
+              </a:spcAft>
+              <a:buClrTx/>
+              <a:buSzTx/>
+              <a:buFontTx/>
+              <a:buNone/>
+              <a:tabLst/>
+              <a:defRPr/>
+            </a:pPr>
+            <a:r>
+              <a:rPr lang="en-US" dirty="0"/>
+              <a:t>Someone will put the link to the code used in this tutorial in the chat, so you can follow along if you like</a:t>
+            </a:r>
+          </a:p>
         </p:txBody>
       </p:sp>
       <p:sp>
@@ -10286,6 +10317,40 @@
               <a:t>I’ll briefly show how to use the WQP web service functions later</a:t>
             </a:r>
           </a:p>
+          <a:p>
+            <a:pPr marL="0" marR="0" lvl="0" indent="0" algn="l" defTabSz="914400" rtl="0" eaLnBrk="1" fontAlgn="auto" latinLnBrk="0" hangingPunct="1">
+              <a:lnSpc>
+                <a:spcPct val="100000"/>
+              </a:lnSpc>
+              <a:spcBef>
+                <a:spcPts val="0"/>
+              </a:spcBef>
+              <a:spcAft>
+                <a:spcPts val="0"/>
+              </a:spcAft>
+              <a:buClrTx/>
+              <a:buSzTx/>
+              <a:buFontTx/>
+              <a:buNone/>
+              <a:tabLst/>
+              <a:defRPr/>
+            </a:pPr>
+            <a:r>
+              <a:rPr lang="en-US" dirty="0"/>
+              <a:t>Again</a:t>
+            </a:r>
+            <a:r>
+              <a:rPr lang="en-US"/>
+              <a:t>, I’ll highlight </a:t>
+            </a:r>
+            <a:r>
+              <a:rPr lang="en-US" dirty="0"/>
+              <a:t>some of the package functions by running through an example</a:t>
+            </a:r>
+          </a:p>
+          <a:p>
+            <a:endParaRPr lang="en-US" dirty="0"/>
+          </a:p>
         </p:txBody>
       </p:sp>
       <p:sp>
@@ -10463,7 +10528,22 @@
           <a:bodyPr/>
           <a:lstStyle/>
           <a:p>
-            <a:endParaRPr lang="en-US" dirty="0"/>
+            <a:r>
+              <a:rPr lang="en-US" dirty="0"/>
+              <a:t>To help with decoding the parameter codes, there is a table within the package that contains a list of all USGS parameter codes</a:t>
+            </a:r>
+          </a:p>
+          <a:p>
+            <a:r>
+              <a:rPr lang="en-US" dirty="0"/>
+              <a:t>Can search this table to learn more about the parameter code you’re interested in</a:t>
+            </a:r>
+          </a:p>
+          <a:p>
+            <a:r>
+              <a:rPr lang="en-US" dirty="0"/>
+              <a:t>Can also use this link to a USGS website provided here that helps with searching for parameter codes</a:t>
+            </a:r>
           </a:p>
         </p:txBody>
       </p:sp>
@@ -10549,13 +10629,7 @@
           <a:p>
             <a:r>
               <a:rPr lang="en-US" dirty="0"/>
-              <a:t>So let’s go back to the data availability table for SR at Freeport station and pull out unique parameter codes</a:t>
-            </a:r>
-          </a:p>
-          <a:p>
-            <a:r>
-              <a:rPr lang="en-US" dirty="0"/>
-              <a:t>Then we’ll filter the parameter code list to only show parameters collected at SR at Freeport</a:t>
+              <a:t>So here is the parameter code list filtered to only show parameters collected at SR at Freeport</a:t>
             </a:r>
           </a:p>
         </p:txBody>
@@ -10746,6 +10820,16 @@
           <a:lstStyle/>
           <a:p>
             <a:r>
+              <a:rPr lang="en-US" dirty="0"/>
+              <a:t>These are the functions you want to use for accessing discrete WQ </a:t>
+            </a:r>
+            <a:r>
+              <a:rPr lang="en-US"/>
+              <a:t>data collected by USGS</a:t>
+            </a:r>
+          </a:p>
+          <a:p>
+            <a:r>
               <a:rPr lang="en-US" dirty="0" err="1"/>
               <a:t>whatWQPsites</a:t>
             </a:r>
@@ -10873,7 +10957,10 @@
           <a:bodyPr/>
           <a:lstStyle/>
           <a:p>
-            <a:endParaRPr lang="en-US" dirty="0"/>
+            <a:r>
+              <a:rPr lang="en-US" dirty="0"/>
+              <a:t>Typically accessing open data from online sources such as online data portals or repositories</a:t>
+            </a:r>
           </a:p>
         </p:txBody>
       </p:sp>
@@ -12090,7 +12177,7 @@
           <a:p>
             <a:r>
               <a:rPr lang="en-US" dirty="0"/>
-              <a:t>Dedicated R packages – help with accessing data, specific to Bay-Delta</a:t>
+              <a:t>Dedicated R packages – help with accessing data, specific to Bay-Delta and IEP</a:t>
             </a:r>
           </a:p>
         </p:txBody>
@@ -13078,7 +13165,10 @@
           <a:bodyPr/>
           <a:lstStyle/>
           <a:p>
-            <a:endParaRPr lang="en-US" dirty="0"/>
+            <a:r>
+              <a:rPr lang="en-US" dirty="0"/>
+              <a:t>Highlight some of the package functions by running through an example</a:t>
+            </a:r>
           </a:p>
         </p:txBody>
       </p:sp>
@@ -13265,7 +13355,7 @@
           <a:p>
             <a:fld id="{D759C49B-C16C-44D6-A235-9C9AF18D3806}" type="datetimeFigureOut">
               <a:rPr lang="en-US" smtClean="0"/>
-              <a:t>4/17/2024</a:t>
+              <a:t>4/18/2024</a:t>
             </a:fld>
             <a:endParaRPr lang="en-US"/>
           </a:p>
@@ -13463,7 +13553,7 @@
           <a:p>
             <a:fld id="{D759C49B-C16C-44D6-A235-9C9AF18D3806}" type="datetimeFigureOut">
               <a:rPr lang="en-US" smtClean="0"/>
-              <a:t>4/17/2024</a:t>
+              <a:t>4/18/2024</a:t>
             </a:fld>
             <a:endParaRPr lang="en-US"/>
           </a:p>
@@ -13671,7 +13761,7 @@
           <a:p>
             <a:fld id="{D759C49B-C16C-44D6-A235-9C9AF18D3806}" type="datetimeFigureOut">
               <a:rPr lang="en-US" smtClean="0"/>
-              <a:t>4/17/2024</a:t>
+              <a:t>4/18/2024</a:t>
             </a:fld>
             <a:endParaRPr lang="en-US"/>
           </a:p>
@@ -13869,7 +13959,7 @@
           <a:p>
             <a:fld id="{D759C49B-C16C-44D6-A235-9C9AF18D3806}" type="datetimeFigureOut">
               <a:rPr lang="en-US" smtClean="0"/>
-              <a:t>4/17/2024</a:t>
+              <a:t>4/18/2024</a:t>
             </a:fld>
             <a:endParaRPr lang="en-US"/>
           </a:p>
@@ -14144,7 +14234,7 @@
           <a:p>
             <a:fld id="{D759C49B-C16C-44D6-A235-9C9AF18D3806}" type="datetimeFigureOut">
               <a:rPr lang="en-US" smtClean="0"/>
-              <a:t>4/17/2024</a:t>
+              <a:t>4/18/2024</a:t>
             </a:fld>
             <a:endParaRPr lang="en-US"/>
           </a:p>
@@ -14409,7 +14499,7 @@
           <a:p>
             <a:fld id="{D759C49B-C16C-44D6-A235-9C9AF18D3806}" type="datetimeFigureOut">
               <a:rPr lang="en-US" smtClean="0"/>
-              <a:t>4/17/2024</a:t>
+              <a:t>4/18/2024</a:t>
             </a:fld>
             <a:endParaRPr lang="en-US"/>
           </a:p>
@@ -14821,7 +14911,7 @@
           <a:p>
             <a:fld id="{D759C49B-C16C-44D6-A235-9C9AF18D3806}" type="datetimeFigureOut">
               <a:rPr lang="en-US" smtClean="0"/>
-              <a:t>4/17/2024</a:t>
+              <a:t>4/18/2024</a:t>
             </a:fld>
             <a:endParaRPr lang="en-US"/>
           </a:p>
@@ -14962,7 +15052,7 @@
           <a:p>
             <a:fld id="{D759C49B-C16C-44D6-A235-9C9AF18D3806}" type="datetimeFigureOut">
               <a:rPr lang="en-US" smtClean="0"/>
-              <a:t>4/17/2024</a:t>
+              <a:t>4/18/2024</a:t>
             </a:fld>
             <a:endParaRPr lang="en-US"/>
           </a:p>
@@ -15075,7 +15165,7 @@
           <a:p>
             <a:fld id="{D759C49B-C16C-44D6-A235-9C9AF18D3806}" type="datetimeFigureOut">
               <a:rPr lang="en-US" smtClean="0"/>
-              <a:t>4/17/2024</a:t>
+              <a:t>4/18/2024</a:t>
             </a:fld>
             <a:endParaRPr lang="en-US"/>
           </a:p>
@@ -15386,7 +15476,7 @@
           <a:p>
             <a:fld id="{D759C49B-C16C-44D6-A235-9C9AF18D3806}" type="datetimeFigureOut">
               <a:rPr lang="en-US" smtClean="0"/>
-              <a:t>4/17/2024</a:t>
+              <a:t>4/18/2024</a:t>
             </a:fld>
             <a:endParaRPr lang="en-US"/>
           </a:p>
@@ -15674,7 +15764,7 @@
           <a:p>
             <a:fld id="{D759C49B-C16C-44D6-A235-9C9AF18D3806}" type="datetimeFigureOut">
               <a:rPr lang="en-US" smtClean="0"/>
-              <a:t>4/17/2024</a:t>
+              <a:t>4/18/2024</a:t>
             </a:fld>
             <a:endParaRPr lang="en-US"/>
           </a:p>
@@ -15915,7 +16005,7 @@
           <a:p>
             <a:fld id="{D759C49B-C16C-44D6-A235-9C9AF18D3806}" type="datetimeFigureOut">
               <a:rPr lang="en-US" smtClean="0"/>
-              <a:t>4/17/2024</a:t>
+              <a:t>4/18/2024</a:t>
             </a:fld>
             <a:endParaRPr lang="en-US"/>
           </a:p>
@@ -23609,7 +23699,10 @@
               <a:rPr lang="en-US" sz="4800" dirty="0" err="1"/>
               <a:t>parameterCdFile</a:t>
             </a:r>
-            <a:endParaRPr lang="en-US" sz="4800" dirty="0"/>
+            <a:r>
+              <a:rPr lang="en-US" sz="4800" dirty="0"/>
+              <a:t> - filtered</a:t>
+            </a:r>
           </a:p>
         </p:txBody>
       </p:sp>
@@ -23702,10 +23795,10 @@
       </p:sp>
       <p:pic>
         <p:nvPicPr>
-          <p:cNvPr id="6" name="Picture 5">
+          <p:cNvPr id="21" name="Picture 20">
             <a:extLst>
               <a:ext uri="{FF2B5EF4-FFF2-40B4-BE49-F238E27FC236}">
-                <a16:creationId xmlns:a16="http://schemas.microsoft.com/office/drawing/2014/main" id="{0EDF5F1E-23F1-09AE-B45D-A8CBD43C4A6E}"/>
+                <a16:creationId xmlns:a16="http://schemas.microsoft.com/office/drawing/2014/main" id="{7B11D046-0E52-7765-C474-D134087048DC}"/>
               </a:ext>
             </a:extLst>
           </p:cNvPr>
@@ -23716,246 +23809,19 @@
         </p:nvPicPr>
         <p:blipFill rotWithShape="1">
           <a:blip r:embed="rId4"/>
-          <a:srcRect l="2766" t="31117" b="43658"/>
+          <a:srcRect t="1140"/>
           <a:stretch/>
         </p:blipFill>
         <p:spPr>
           <a:xfrm>
-            <a:off x="834182" y="1550257"/>
-            <a:ext cx="6622924" cy="192966"/>
+            <a:off x="838200" y="2115217"/>
+            <a:ext cx="9107171" cy="2627565"/>
           </a:xfrm>
           <a:prstGeom prst="rect">
             <a:avLst/>
           </a:prstGeom>
         </p:spPr>
       </p:pic>
-      <p:pic>
-        <p:nvPicPr>
-          <p:cNvPr id="7" name="Picture 6">
-            <a:extLst>
-              <a:ext uri="{FF2B5EF4-FFF2-40B4-BE49-F238E27FC236}">
-                <a16:creationId xmlns:a16="http://schemas.microsoft.com/office/drawing/2014/main" id="{98628EB0-C8DF-A524-E88B-FE7545F72B52}"/>
-              </a:ext>
-            </a:extLst>
-          </p:cNvPr>
-          <p:cNvPicPr>
-            <a:picLocks noChangeAspect="1"/>
-          </p:cNvPicPr>
-          <p:nvPr/>
-        </p:nvPicPr>
-        <p:blipFill rotWithShape="1">
-          <a:blip r:embed="rId5"/>
-          <a:srcRect l="1859" t="20977" r="22547" b="63044"/>
-          <a:stretch/>
-        </p:blipFill>
-        <p:spPr>
-          <a:xfrm>
-            <a:off x="834182" y="1774192"/>
-            <a:ext cx="4649821" cy="408562"/>
-          </a:xfrm>
-          <a:prstGeom prst="rect">
-            <a:avLst/>
-          </a:prstGeom>
-        </p:spPr>
-      </p:pic>
-      <p:grpSp>
-        <p:nvGrpSpPr>
-          <p:cNvPr id="20" name="Group 19">
-            <a:extLst>
-              <a:ext uri="{FF2B5EF4-FFF2-40B4-BE49-F238E27FC236}">
-                <a16:creationId xmlns:a16="http://schemas.microsoft.com/office/drawing/2014/main" id="{C945AB72-8F8B-D7C7-AA98-700E1EA6AA81}"/>
-              </a:ext>
-            </a:extLst>
-          </p:cNvPr>
-          <p:cNvGrpSpPr/>
-          <p:nvPr/>
-        </p:nvGrpSpPr>
-        <p:grpSpPr>
-          <a:xfrm>
-            <a:off x="834182" y="1944620"/>
-            <a:ext cx="8402223" cy="807901"/>
-            <a:chOff x="834182" y="1944620"/>
-            <a:chExt cx="8402223" cy="807901"/>
-          </a:xfrm>
-        </p:grpSpPr>
-        <p:sp>
-          <p:nvSpPr>
-            <p:cNvPr id="16" name="Arrow: Bent 15">
-              <a:extLst>
-                <a:ext uri="{FF2B5EF4-FFF2-40B4-BE49-F238E27FC236}">
-                  <a16:creationId xmlns:a16="http://schemas.microsoft.com/office/drawing/2014/main" id="{9917A085-071D-AAF3-D084-986533A8839D}"/>
-                </a:ext>
-              </a:extLst>
-            </p:cNvPr>
-            <p:cNvSpPr/>
-            <p:nvPr/>
-          </p:nvSpPr>
-          <p:spPr>
-            <a:xfrm rot="5400000">
-              <a:off x="5578741" y="1955563"/>
-              <a:ext cx="408562" cy="386675"/>
-            </a:xfrm>
-            <a:prstGeom prst="bentArrow">
-              <a:avLst/>
-            </a:prstGeom>
-            <a:solidFill>
-              <a:srgbClr val="C00000"/>
-            </a:solidFill>
-          </p:spPr>
-          <p:style>
-            <a:lnRef idx="2">
-              <a:schemeClr val="accent1">
-                <a:shade val="15000"/>
-              </a:schemeClr>
-            </a:lnRef>
-            <a:fillRef idx="1">
-              <a:schemeClr val="accent1"/>
-            </a:fillRef>
-            <a:effectRef idx="0">
-              <a:schemeClr val="accent1"/>
-            </a:effectRef>
-            <a:fontRef idx="minor">
-              <a:schemeClr val="lt1"/>
-            </a:fontRef>
-          </p:style>
-          <p:txBody>
-            <a:bodyPr rtlCol="0" anchor="ctr"/>
-            <a:lstStyle/>
-            <a:p>
-              <a:pPr algn="ctr"/>
-              <a:endParaRPr lang="en-US"/>
-            </a:p>
-          </p:txBody>
-        </p:sp>
-        <p:pic>
-          <p:nvPicPr>
-            <p:cNvPr id="17" name="Picture 16">
-              <a:extLst>
-                <a:ext uri="{FF2B5EF4-FFF2-40B4-BE49-F238E27FC236}">
-                  <a16:creationId xmlns:a16="http://schemas.microsoft.com/office/drawing/2014/main" id="{C7FFDF92-0794-1742-150F-A99AEB556D0D}"/>
-                </a:ext>
-              </a:extLst>
-            </p:cNvPr>
-            <p:cNvPicPr>
-              <a:picLocks noChangeAspect="1"/>
-            </p:cNvPicPr>
-            <p:nvPr/>
-          </p:nvPicPr>
-          <p:blipFill rotWithShape="1">
-            <a:blip r:embed="rId6"/>
-            <a:srcRect b="12983"/>
-            <a:stretch/>
-          </p:blipFill>
-          <p:spPr>
-            <a:xfrm>
-              <a:off x="834182" y="2420940"/>
-              <a:ext cx="8402223" cy="331581"/>
-            </a:xfrm>
-            <a:prstGeom prst="rect">
-              <a:avLst/>
-            </a:prstGeom>
-          </p:spPr>
-        </p:pic>
-      </p:grpSp>
-      <p:grpSp>
-        <p:nvGrpSpPr>
-          <p:cNvPr id="24" name="Group 23">
-            <a:extLst>
-              <a:ext uri="{FF2B5EF4-FFF2-40B4-BE49-F238E27FC236}">
-                <a16:creationId xmlns:a16="http://schemas.microsoft.com/office/drawing/2014/main" id="{335E2FD6-C4E1-BC0B-F256-A02CAD754D5E}"/>
-              </a:ext>
-            </a:extLst>
-          </p:cNvPr>
-          <p:cNvGrpSpPr/>
-          <p:nvPr/>
-        </p:nvGrpSpPr>
-        <p:grpSpPr>
-          <a:xfrm>
-            <a:off x="835537" y="3317134"/>
-            <a:ext cx="9107171" cy="3285939"/>
-            <a:chOff x="835537" y="3317134"/>
-            <a:chExt cx="9107171" cy="3285939"/>
-          </a:xfrm>
-        </p:grpSpPr>
-        <p:pic>
-          <p:nvPicPr>
-            <p:cNvPr id="21" name="Picture 20">
-              <a:extLst>
-                <a:ext uri="{FF2B5EF4-FFF2-40B4-BE49-F238E27FC236}">
-                  <a16:creationId xmlns:a16="http://schemas.microsoft.com/office/drawing/2014/main" id="{7B11D046-0E52-7765-C474-D134087048DC}"/>
-                </a:ext>
-              </a:extLst>
-            </p:cNvPr>
-            <p:cNvPicPr>
-              <a:picLocks noChangeAspect="1"/>
-            </p:cNvPicPr>
-            <p:nvPr/>
-          </p:nvPicPr>
-          <p:blipFill rotWithShape="1">
-            <a:blip r:embed="rId7"/>
-            <a:srcRect t="1140"/>
-            <a:stretch/>
-          </p:blipFill>
-          <p:spPr>
-            <a:xfrm>
-              <a:off x="835537" y="3975508"/>
-              <a:ext cx="9107171" cy="2627565"/>
-            </a:xfrm>
-            <a:prstGeom prst="rect">
-              <a:avLst/>
-            </a:prstGeom>
-          </p:spPr>
-        </p:pic>
-        <p:sp>
-          <p:nvSpPr>
-            <p:cNvPr id="22" name="Arrow: Bent 21">
-              <a:extLst>
-                <a:ext uri="{FF2B5EF4-FFF2-40B4-BE49-F238E27FC236}">
-                  <a16:creationId xmlns:a16="http://schemas.microsoft.com/office/drawing/2014/main" id="{9E3C893A-D865-FD87-F8CE-F4D273C9B140}"/>
-                </a:ext>
-              </a:extLst>
-            </p:cNvPr>
-            <p:cNvSpPr/>
-            <p:nvPr/>
-          </p:nvSpPr>
-          <p:spPr>
-            <a:xfrm rot="5400000">
-              <a:off x="5489077" y="3417740"/>
-              <a:ext cx="587888" cy="386675"/>
-            </a:xfrm>
-            <a:prstGeom prst="bentArrow">
-              <a:avLst/>
-            </a:prstGeom>
-            <a:solidFill>
-              <a:srgbClr val="C00000"/>
-            </a:solidFill>
-          </p:spPr>
-          <p:style>
-            <a:lnRef idx="2">
-              <a:schemeClr val="accent1">
-                <a:shade val="15000"/>
-              </a:schemeClr>
-            </a:lnRef>
-            <a:fillRef idx="1">
-              <a:schemeClr val="accent1"/>
-            </a:fillRef>
-            <a:effectRef idx="0">
-              <a:schemeClr val="accent1"/>
-            </a:effectRef>
-            <a:fontRef idx="minor">
-              <a:schemeClr val="lt1"/>
-            </a:fontRef>
-          </p:style>
-          <p:txBody>
-            <a:bodyPr rtlCol="0" anchor="ctr"/>
-            <a:lstStyle/>
-            <a:p>
-              <a:pPr algn="ctr"/>
-              <a:endParaRPr lang="en-US"/>
-            </a:p>
-          </p:txBody>
-        </p:sp>
-      </p:grpSp>
       <p:sp>
         <p:nvSpPr>
           <p:cNvPr id="14" name="Rectangle: Rounded Corners 13">
@@ -23970,7 +23836,7 @@
         </p:nvSpPr>
         <p:spPr>
           <a:xfrm>
-            <a:off x="911364" y="5037341"/>
+            <a:off x="914027" y="3177050"/>
             <a:ext cx="8869680" cy="182880"/>
           </a:xfrm>
           <a:prstGeom prst="roundRect">
@@ -24008,112 +23874,6 @@
           </a:p>
         </p:txBody>
       </p:sp>
-      <p:grpSp>
-        <p:nvGrpSpPr>
-          <p:cNvPr id="23" name="Group 22">
-            <a:extLst>
-              <a:ext uri="{FF2B5EF4-FFF2-40B4-BE49-F238E27FC236}">
-                <a16:creationId xmlns:a16="http://schemas.microsoft.com/office/drawing/2014/main" id="{D7CF3055-8960-DA53-F1D1-8DC745B4C8DD}"/>
-              </a:ext>
-            </a:extLst>
-          </p:cNvPr>
-          <p:cNvGrpSpPr/>
-          <p:nvPr/>
-        </p:nvGrpSpPr>
-        <p:grpSpPr>
-          <a:xfrm>
-            <a:off x="661481" y="1445033"/>
-            <a:ext cx="8764621" cy="2303680"/>
-            <a:chOff x="661481" y="1445033"/>
-            <a:chExt cx="8764621" cy="2303680"/>
-          </a:xfrm>
-        </p:grpSpPr>
-        <p:pic>
-          <p:nvPicPr>
-            <p:cNvPr id="19" name="Picture 18">
-              <a:extLst>
-                <a:ext uri="{FF2B5EF4-FFF2-40B4-BE49-F238E27FC236}">
-                  <a16:creationId xmlns:a16="http://schemas.microsoft.com/office/drawing/2014/main" id="{EFCBDE23-6D58-66DF-8DA6-15DA293A263D}"/>
-                </a:ext>
-              </a:extLst>
-            </p:cNvPr>
-            <p:cNvPicPr>
-              <a:picLocks noChangeAspect="1"/>
-            </p:cNvPicPr>
-            <p:nvPr/>
-          </p:nvPicPr>
-          <p:blipFill rotWithShape="1">
-            <a:blip r:embed="rId5"/>
-            <a:srcRect l="1859" t="40379" r="22547" b="29565"/>
-            <a:stretch/>
-          </p:blipFill>
-          <p:spPr>
-            <a:xfrm>
-              <a:off x="834182" y="2980228"/>
-              <a:ext cx="4649821" cy="768485"/>
-            </a:xfrm>
-            <a:prstGeom prst="rect">
-              <a:avLst/>
-            </a:prstGeom>
-          </p:spPr>
-        </p:pic>
-        <p:sp>
-          <p:nvSpPr>
-            <p:cNvPr id="11" name="Rectangle 10">
-              <a:extLst>
-                <a:ext uri="{FF2B5EF4-FFF2-40B4-BE49-F238E27FC236}">
-                  <a16:creationId xmlns:a16="http://schemas.microsoft.com/office/drawing/2014/main" id="{0691612A-AF71-FDC2-1750-63DC7F6FD7F3}"/>
-                </a:ext>
-              </a:extLst>
-            </p:cNvPr>
-            <p:cNvSpPr/>
-            <p:nvPr/>
-          </p:nvSpPr>
-          <p:spPr>
-            <a:xfrm>
-              <a:off x="661481" y="1445033"/>
-              <a:ext cx="8764621" cy="1437459"/>
-            </a:xfrm>
-            <a:prstGeom prst="rect">
-              <a:avLst/>
-            </a:prstGeom>
-            <a:solidFill>
-              <a:schemeClr val="tx1">
-                <a:lumMod val="95000"/>
-                <a:lumOff val="5000"/>
-                <a:alpha val="60000"/>
-              </a:schemeClr>
-            </a:solidFill>
-            <a:ln>
-              <a:noFill/>
-            </a:ln>
-          </p:spPr>
-          <p:style>
-            <a:lnRef idx="2">
-              <a:schemeClr val="accent1">
-                <a:shade val="15000"/>
-              </a:schemeClr>
-            </a:lnRef>
-            <a:fillRef idx="1">
-              <a:schemeClr val="accent1"/>
-            </a:fillRef>
-            <a:effectRef idx="0">
-              <a:schemeClr val="accent1"/>
-            </a:effectRef>
-            <a:fontRef idx="minor">
-              <a:schemeClr val="lt1"/>
-            </a:fontRef>
-          </p:style>
-          <p:txBody>
-            <a:bodyPr rtlCol="0" anchor="ctr"/>
-            <a:lstStyle/>
-            <a:p>
-              <a:pPr algn="ctr"/>
-              <a:endParaRPr lang="en-US"/>
-            </a:p>
-          </p:txBody>
-        </p:sp>
-      </p:grpSp>
     </p:spTree>
     <p:extLst>
       <p:ext uri="{BB962C8B-B14F-4D97-AF65-F5344CB8AC3E}">
@@ -24145,7 +23905,7 @@
                             </p:stCondLst>
                             <p:childTnLst>
                               <p:par>
-                                <p:cTn id="5" presetID="1" presetClass="entr" presetSubtype="0" fill="hold" nodeType="clickEffect">
+                                <p:cTn id="5" presetID="1" presetClass="entr" presetSubtype="0" fill="hold" grpId="0" nodeType="clickEffect">
                                   <p:stCondLst>
                                     <p:cond delay="0"/>
                                   </p:stCondLst>
@@ -24153,141 +23913,6 @@
                                     <p:set>
                                       <p:cBhvr>
                                         <p:cTn id="6" dur="1" fill="hold">
-                                          <p:stCondLst>
-                                            <p:cond delay="0"/>
-                                          </p:stCondLst>
-                                        </p:cTn>
-                                        <p:tgtEl>
-                                          <p:spTgt spid="20"/>
-                                        </p:tgtEl>
-                                        <p:attrNameLst>
-                                          <p:attrName>style.visibility</p:attrName>
-                                        </p:attrNameLst>
-                                      </p:cBhvr>
-                                      <p:to>
-                                        <p:strVal val="visible"/>
-                                      </p:to>
-                                    </p:set>
-                                  </p:childTnLst>
-                                </p:cTn>
-                              </p:par>
-                            </p:childTnLst>
-                          </p:cTn>
-                        </p:par>
-                      </p:childTnLst>
-                    </p:cTn>
-                  </p:par>
-                  <p:par>
-                    <p:cTn id="7" fill="hold">
-                      <p:stCondLst>
-                        <p:cond delay="indefinite"/>
-                      </p:stCondLst>
-                      <p:childTnLst>
-                        <p:par>
-                          <p:cTn id="8" fill="hold">
-                            <p:stCondLst>
-                              <p:cond delay="0"/>
-                            </p:stCondLst>
-                            <p:childTnLst>
-                              <p:par>
-                                <p:cTn id="9" presetID="1" presetClass="entr" presetSubtype="0" fill="hold" nodeType="clickEffect">
-                                  <p:stCondLst>
-                                    <p:cond delay="0"/>
-                                  </p:stCondLst>
-                                  <p:childTnLst>
-                                    <p:set>
-                                      <p:cBhvr>
-                                        <p:cTn id="10" dur="1" fill="hold">
-                                          <p:stCondLst>
-                                            <p:cond delay="0"/>
-                                          </p:stCondLst>
-                                        </p:cTn>
-                                        <p:tgtEl>
-                                          <p:spTgt spid="23"/>
-                                        </p:tgtEl>
-                                        <p:attrNameLst>
-                                          <p:attrName>style.visibility</p:attrName>
-                                        </p:attrNameLst>
-                                      </p:cBhvr>
-                                      <p:to>
-                                        <p:strVal val="visible"/>
-                                      </p:to>
-                                    </p:set>
-                                  </p:childTnLst>
-                                </p:cTn>
-                              </p:par>
-                            </p:childTnLst>
-                          </p:cTn>
-                        </p:par>
-                      </p:childTnLst>
-                    </p:cTn>
-                  </p:par>
-                  <p:par>
-                    <p:cTn id="11" fill="hold">
-                      <p:stCondLst>
-                        <p:cond delay="indefinite"/>
-                      </p:stCondLst>
-                      <p:childTnLst>
-                        <p:par>
-                          <p:cTn id="12" fill="hold">
-                            <p:stCondLst>
-                              <p:cond delay="0"/>
-                            </p:stCondLst>
-                            <p:childTnLst>
-                              <p:par>
-                                <p:cTn id="13" presetID="1" presetClass="entr" presetSubtype="0" fill="hold" nodeType="clickEffect">
-                                  <p:stCondLst>
-                                    <p:cond delay="0"/>
-                                  </p:stCondLst>
-                                  <p:childTnLst>
-                                    <p:set>
-                                      <p:cBhvr>
-                                        <p:cTn id="14" dur="1" fill="hold">
-                                          <p:stCondLst>
-                                            <p:cond delay="0"/>
-                                          </p:stCondLst>
-                                        </p:cTn>
-                                        <p:tgtEl>
-                                          <p:spTgt spid="24"/>
-                                        </p:tgtEl>
-                                        <p:attrNameLst>
-                                          <p:attrName>style.visibility</p:attrName>
-                                        </p:attrNameLst>
-                                      </p:cBhvr>
-                                      <p:to>
-                                        <p:strVal val="visible"/>
-                                      </p:to>
-                                    </p:set>
-                                  </p:childTnLst>
-                                </p:cTn>
-                              </p:par>
-                            </p:childTnLst>
-                          </p:cTn>
-                        </p:par>
-                      </p:childTnLst>
-                    </p:cTn>
-                  </p:par>
-                  <p:par>
-                    <p:cTn id="15" fill="hold">
-                      <p:stCondLst>
-                        <p:cond delay="indefinite"/>
-                      </p:stCondLst>
-                      <p:childTnLst>
-                        <p:par>
-                          <p:cTn id="16" fill="hold">
-                            <p:stCondLst>
-                              <p:cond delay="0"/>
-                            </p:stCondLst>
-                            <p:childTnLst>
-                              <p:par>
-                                <p:cTn id="17" presetID="1" presetClass="entr" presetSubtype="0" fill="hold" grpId="0" nodeType="clickEffect">
-                                  <p:stCondLst>
-                                    <p:cond delay="0"/>
-                                  </p:stCondLst>
-                                  <p:childTnLst>
-                                    <p:set>
-                                      <p:cBhvr>
-                                        <p:cTn id="18" dur="1" fill="hold">
                                           <p:stCondLst>
                                             <p:cond delay="0"/>
                                           </p:stCondLst>
@@ -38542,6 +38167,26 @@
 </file>
 
 <file path=customXml/item1.xml><?xml version="1.0" encoding="utf-8"?>
+<?mso-contentType ?>
+<FormTemplates xmlns="http://schemas.microsoft.com/sharepoint/v3/contenttype/forms">
+  <Display>DocumentLibraryForm</Display>
+  <Edit>DocumentLibraryForm</Edit>
+  <New>DocumentLibraryForm</New>
+</FormTemplates>
+</file>
+
+<file path=customXml/item2.xml><?xml version="1.0" encoding="utf-8"?>
+<p:properties xmlns:p="http://schemas.microsoft.com/office/2006/metadata/properties" xmlns:xsi="http://www.w3.org/2001/XMLSchema-instance" xmlns:pc="http://schemas.microsoft.com/office/infopath/2007/PartnerControls">
+  <documentManagement>
+    <TaxCatchAll xmlns="f60d4be9-3557-4154-8f7f-0f7fc20459a7" xsi:nil="true"/>
+    <lcf76f155ced4ddcb4097134ff3c332f xmlns="8b6ba10b-a228-4f4d-bf61-76f051627eb1">
+      <Terms xmlns="http://schemas.microsoft.com/office/infopath/2007/PartnerControls"/>
+    </lcf76f155ced4ddcb4097134ff3c332f>
+  </documentManagement>
+</p:properties>
+</file>
+
+<file path=customXml/item3.xml><?xml version="1.0" encoding="utf-8"?>
 <ct:contentTypeSchema xmlns:ct="http://schemas.microsoft.com/office/2006/metadata/contentType" xmlns:ma="http://schemas.microsoft.com/office/2006/metadata/properties/metaAttributes" ct:_="" ma:_="" ma:contentTypeName="Document" ma:contentTypeID="0x0101009C2CC601CF85AD4AAE2E8C1628370B4C" ma:contentTypeVersion="" ma:contentTypeDescription="Create a new document." ma:contentTypeScope="" ma:versionID="81d43700bbd5370bc97db83268c40a77">
   <xsd:schema xmlns:xsd="http://www.w3.org/2001/XMLSchema" xmlns:xs="http://www.w3.org/2001/XMLSchema" xmlns:p="http://schemas.microsoft.com/office/2006/metadata/properties" xmlns:ns2="8b6ba10b-a228-4f4d-bf61-76f051627eb1" xmlns:ns3="4fa31878-c15f-4cc2-b832-57ca6f3405c8" xmlns:ns4="f60d4be9-3557-4154-8f7f-0f7fc20459a7" targetNamespace="http://schemas.microsoft.com/office/2006/metadata/properties" ma:root="true" ma:fieldsID="2f4e98d2ff7a2a20f42e5462f46da254" ns2:_="" ns3:_="" ns4:_="">
     <xsd:import namespace="8b6ba10b-a228-4f4d-bf61-76f051627eb1"/>
@@ -38775,27 +38420,26 @@
 </ct:contentTypeSchema>
 </file>
 
-<file path=customXml/item2.xml><?xml version="1.0" encoding="utf-8"?>
-<?mso-contentType ?>
-<FormTemplates xmlns="http://schemas.microsoft.com/sharepoint/v3/contenttype/forms">
-  <Display>DocumentLibraryForm</Display>
-  <Edit>DocumentLibraryForm</Edit>
-  <New>DocumentLibraryForm</New>
-</FormTemplates>
+<file path=customXml/itemProps1.xml><?xml version="1.0" encoding="utf-8"?>
+<ds:datastoreItem xmlns:ds="http://schemas.openxmlformats.org/officeDocument/2006/customXml" ds:itemID="{171A1F1B-C820-4AD5-95EF-D03F876320B3}">
+  <ds:schemaRefs>
+    <ds:schemaRef ds:uri="http://schemas.microsoft.com/sharepoint/v3/contenttype/forms"/>
+  </ds:schemaRefs>
+</ds:datastoreItem>
 </file>
 
-<file path=customXml/item3.xml><?xml version="1.0" encoding="utf-8"?>
-<p:properties xmlns:p="http://schemas.microsoft.com/office/2006/metadata/properties" xmlns:xsi="http://www.w3.org/2001/XMLSchema-instance" xmlns:pc="http://schemas.microsoft.com/office/infopath/2007/PartnerControls">
-  <documentManagement>
-    <TaxCatchAll xmlns="f60d4be9-3557-4154-8f7f-0f7fc20459a7" xsi:nil="true"/>
-    <lcf76f155ced4ddcb4097134ff3c332f xmlns="8b6ba10b-a228-4f4d-bf61-76f051627eb1">
-      <Terms xmlns="http://schemas.microsoft.com/office/infopath/2007/PartnerControls"/>
-    </lcf76f155ced4ddcb4097134ff3c332f>
-  </documentManagement>
-</p:properties>
+<file path=customXml/itemProps2.xml><?xml version="1.0" encoding="utf-8"?>
+<ds:datastoreItem xmlns:ds="http://schemas.openxmlformats.org/officeDocument/2006/customXml" ds:itemID="{7610E87D-0194-4853-B344-24088B47C682}">
+  <ds:schemaRefs>
+    <ds:schemaRef ds:uri="http://schemas.microsoft.com/office/2006/metadata/properties"/>
+    <ds:schemaRef ds:uri="http://schemas.microsoft.com/office/infopath/2007/PartnerControls"/>
+    <ds:schemaRef ds:uri="f60d4be9-3557-4154-8f7f-0f7fc20459a7"/>
+    <ds:schemaRef ds:uri="8b6ba10b-a228-4f4d-bf61-76f051627eb1"/>
+  </ds:schemaRefs>
+</ds:datastoreItem>
 </file>
 
-<file path=customXml/itemProps1.xml><?xml version="1.0" encoding="utf-8"?>
+<file path=customXml/itemProps3.xml><?xml version="1.0" encoding="utf-8"?>
 <ds:datastoreItem xmlns:ds="http://schemas.openxmlformats.org/officeDocument/2006/customXml" ds:itemID="{D7DC66B8-D478-434C-8736-6497A801EE97}">
   <ds:schemaRefs>
     <ds:schemaRef ds:uri="http://schemas.microsoft.com/office/2006/metadata/contentType"/>
@@ -38813,23 +38457,4 @@
     <ds:schemaRef ds:uri="http://schemas.microsoft.com/internal/obd"/>
   </ds:schemaRefs>
 </ds:datastoreItem>
-</file>
-
-<file path=customXml/itemProps2.xml><?xml version="1.0" encoding="utf-8"?>
-<ds:datastoreItem xmlns:ds="http://schemas.openxmlformats.org/officeDocument/2006/customXml" ds:itemID="{171A1F1B-C820-4AD5-95EF-D03F876320B3}">
-  <ds:schemaRefs>
-    <ds:schemaRef ds:uri="http://schemas.microsoft.com/sharepoint/v3/contenttype/forms"/>
-  </ds:schemaRefs>
-</ds:datastoreItem>
-</file>
-
-<file path=customXml/itemProps3.xml><?xml version="1.0" encoding="utf-8"?>
-<ds:datastoreItem xmlns:ds="http://schemas.openxmlformats.org/officeDocument/2006/customXml" ds:itemID="{7610E87D-0194-4853-B344-24088B47C682}">
-  <ds:schemaRefs>
-    <ds:schemaRef ds:uri="http://schemas.microsoft.com/office/2006/metadata/properties"/>
-    <ds:schemaRef ds:uri="http://schemas.microsoft.com/office/infopath/2007/PartnerControls"/>
-    <ds:schemaRef ds:uri="f60d4be9-3557-4154-8f7f-0f7fc20459a7"/>
-    <ds:schemaRef ds:uri="8b6ba10b-a228-4f4d-bf61-76f051627eb1"/>
-  </ds:schemaRefs>
-</ds:datastoreItem>
 </file>
</xml_diff>